<commit_message>
Minor fixes on polumorphism basics slides
</commit_message>
<xml_diff>
--- a/Courses/Software-Sciences/Module-1-OOP/11.1-Polymorphism-Basics/11.1-Polymorphism-Basics.pptx
+++ b/Courses/Software-Sciences/Module-1-OOP/11.1-Polymorphism-Basics/11.1-Polymorphism-Basics.pptx
@@ -327,7 +327,7 @@
           <a:p>
             <a:fld id="{4E087215-0C8F-4762-A664-737A353EC9A4}" type="datetimeFigureOut">
               <a:rPr lang="bg-BG" smtClean="0"/>
-              <a:t>18.01.23 г.</a:t>
+              <a:t>17.05.23 г.</a:t>
             </a:fld>
             <a:endParaRPr lang="bg-BG"/>
           </a:p>
@@ -518,7 +518,7 @@
           <a:p>
             <a:fld id="{72D84649-876A-46C9-8472-14CB09C070D8}" type="datetimeFigureOut">
               <a:rPr lang="en-US" smtClean="0"/>
-              <a:t>1/18/23</a:t>
+              <a:t>5/17/23</a:t>
             </a:fld>
             <a:endParaRPr lang="en-US"/>
           </a:p>
@@ -15637,7 +15637,7 @@
               <a:rPr lang="en-US" dirty="0">
                 <a:hlinkClick r:id="rId3"/>
               </a:rPr>
-              <a:t>https://judge.softuni.bg/Contests/Practice/Index/3167#0</a:t>
+              <a:t>https://judge.softuni.org/Contests/Practice/Index/4068#0</a:t>
             </a:r>
             <a:endParaRPr lang="en-US" u="sng" dirty="0">
               <a:solidFill>
@@ -25691,7 +25691,7 @@
               <a:rPr lang="en-US" dirty="0">
                 <a:hlinkClick r:id="rId3"/>
               </a:rPr>
-              <a:t>https://judge.softuni.bg/Contests/Practice/Index/3167#1</a:t>
+              <a:t>https://judge.softuni.org/Contests/Practice/Index/4068#1</a:t>
             </a:r>
             <a:endParaRPr lang="en-US" u="sng" dirty="0">
               <a:solidFill>
@@ -29942,7 +29942,7 @@
         </p:nvGrpSpPr>
         <p:grpSpPr>
           <a:xfrm>
-            <a:off x="191942" y="1428715"/>
+            <a:off x="484387" y="1443818"/>
             <a:ext cx="9714058" cy="5300339"/>
             <a:chOff x="472011" y="1508786"/>
             <a:chExt cx="3799787" cy="4865561"/>
@@ -30448,66 +30448,80 @@
               </a:buClr>
             </a:pPr>
             <a:r>
-              <a:rPr lang="bg-BG" sz="3400">
+              <a:rPr lang="bg-BG" sz="3400" dirty="0">
                 <a:solidFill>
                   <a:schemeClr val="bg2"/>
                 </a:solidFill>
+                <a:latin typeface="Calibri" panose="020F0502020204030204" pitchFamily="34" charset="0"/>
+                <a:cs typeface="Calibri" panose="020F0502020204030204" pitchFamily="34" charset="0"/>
               </a:rPr>
               <a:t>Полиморфизъм</a:t>
             </a:r>
             <a:r>
-              <a:rPr lang="en-US" sz="3400">
+              <a:rPr lang="en-US" sz="3400" dirty="0">
                 <a:solidFill>
                   <a:schemeClr val="bg2"/>
                 </a:solidFill>
+                <a:latin typeface="Calibri" panose="020F0502020204030204" pitchFamily="34" charset="0"/>
+                <a:cs typeface="Calibri" panose="020F0502020204030204" pitchFamily="34" charset="0"/>
               </a:rPr>
               <a:t> – </a:t>
             </a:r>
             <a:r>
-              <a:rPr lang="bg-BG" sz="3400">
+              <a:rPr lang="bg-BG" sz="3400" dirty="0">
                 <a:solidFill>
                   <a:schemeClr val="bg2"/>
                 </a:solidFill>
+                <a:latin typeface="Calibri" panose="020F0502020204030204" pitchFamily="34" charset="0"/>
+                <a:cs typeface="Calibri" panose="020F0502020204030204" pitchFamily="34" charset="0"/>
               </a:rPr>
               <a:t>способността на един </a:t>
             </a:r>
             <a:r>
-              <a:rPr lang="bg-BG" sz="3400">
+              <a:rPr lang="bg-BG" sz="3400" dirty="0">
                 <a:solidFill>
                   <a:schemeClr val="bg1">
                     <a:lumMod val="60000"/>
                     <a:lumOff val="40000"/>
                   </a:schemeClr>
                 </a:solidFill>
+                <a:latin typeface="Calibri" panose="020F0502020204030204" pitchFamily="34" charset="0"/>
+                <a:cs typeface="Calibri" panose="020F0502020204030204" pitchFamily="34" charset="0"/>
               </a:rPr>
               <a:t>обект </a:t>
             </a:r>
             <a:r>
-              <a:rPr lang="bg-BG" sz="3400">
+              <a:rPr lang="bg-BG" sz="3400" dirty="0">
                 <a:solidFill>
                   <a:schemeClr val="bg2"/>
                 </a:solidFill>
+                <a:latin typeface="Calibri" panose="020F0502020204030204" pitchFamily="34" charset="0"/>
+                <a:cs typeface="Calibri" panose="020F0502020204030204" pitchFamily="34" charset="0"/>
               </a:rPr>
               <a:t>да приема </a:t>
             </a:r>
             <a:r>
-              <a:rPr lang="bg-BG" sz="3400">
+              <a:rPr lang="bg-BG" sz="3400" dirty="0">
                 <a:solidFill>
                   <a:schemeClr val="bg1">
                     <a:lumMod val="60000"/>
                     <a:lumOff val="40000"/>
                   </a:schemeClr>
                 </a:solidFill>
+                <a:latin typeface="Calibri" panose="020F0502020204030204" pitchFamily="34" charset="0"/>
+                <a:cs typeface="Calibri" panose="020F0502020204030204" pitchFamily="34" charset="0"/>
               </a:rPr>
               <a:t>много форми</a:t>
             </a:r>
-            <a:endParaRPr lang="en-US" sz="3400">
+            <a:endParaRPr lang="en-US" sz="3400" dirty="0">
               <a:solidFill>
                 <a:schemeClr val="bg1">
                   <a:lumMod val="60000"/>
                   <a:lumOff val="40000"/>
                 </a:schemeClr>
               </a:solidFill>
+              <a:latin typeface="Calibri" panose="020F0502020204030204" pitchFamily="34" charset="0"/>
+              <a:cs typeface="Calibri" panose="020F0502020204030204" pitchFamily="34" charset="0"/>
             </a:endParaRPr>
           </a:p>
           <a:p>
@@ -30526,18 +30540,22 @@
               </a:buClr>
             </a:pPr>
             <a:r>
-              <a:rPr lang="bg-BG" sz="3400">
+              <a:rPr lang="bg-BG" sz="3400" dirty="0">
                 <a:solidFill>
                   <a:schemeClr val="bg2"/>
                 </a:solidFill>
+                <a:latin typeface="Calibri" panose="020F0502020204030204" pitchFamily="34" charset="0"/>
+                <a:cs typeface="Calibri" panose="020F0502020204030204" pitchFamily="34" charset="0"/>
               </a:rPr>
               <a:t>Видове полиморфизъм</a:t>
             </a:r>
             <a:r>
-              <a:rPr lang="en-US" sz="3400">
+              <a:rPr lang="en-US" sz="3400" dirty="0">
                 <a:solidFill>
                   <a:schemeClr val="bg2"/>
                 </a:solidFill>
+                <a:latin typeface="Calibri" panose="020F0502020204030204" pitchFamily="34" charset="0"/>
+                <a:cs typeface="Calibri" panose="020F0502020204030204" pitchFamily="34" charset="0"/>
               </a:rPr>
               <a:t>:</a:t>
             </a:r>
@@ -30558,13 +30576,15 @@
               </a:buClr>
             </a:pPr>
             <a:r>
-              <a:rPr lang="bg-BG" sz="3200">
+              <a:rPr lang="bg-BG" sz="3200" dirty="0">
                 <a:solidFill>
                   <a:schemeClr val="bg1">
                     <a:lumMod val="60000"/>
                     <a:lumOff val="40000"/>
                   </a:schemeClr>
                 </a:solidFill>
+                <a:latin typeface="Calibri" panose="020F0502020204030204" pitchFamily="34" charset="0"/>
+                <a:cs typeface="Calibri" panose="020F0502020204030204" pitchFamily="34" charset="0"/>
               </a:rPr>
               <a:t>По време на компилация</a:t>
             </a:r>
@@ -30585,55 +30605,67 @@
               </a:buClr>
             </a:pPr>
             <a:r>
-              <a:rPr lang="bg-BG" sz="3000">
+              <a:rPr lang="bg-BG" sz="3000" dirty="0">
                 <a:solidFill>
                   <a:schemeClr val="bg2"/>
                 </a:solidFill>
+                <a:latin typeface="Calibri" panose="020F0502020204030204" pitchFamily="34" charset="0"/>
+                <a:cs typeface="Calibri" panose="020F0502020204030204" pitchFamily="34" charset="0"/>
               </a:rPr>
               <a:t>Осъществява се чрез </a:t>
             </a:r>
             <a:r>
-              <a:rPr lang="en-US" sz="3000">
+              <a:rPr lang="en-US" sz="3000" dirty="0">
                 <a:solidFill>
                   <a:schemeClr val="bg1">
                     <a:lumMod val="60000"/>
                     <a:lumOff val="40000"/>
                   </a:schemeClr>
                 </a:solidFill>
+                <a:latin typeface="Calibri" panose="020F0502020204030204" pitchFamily="34" charset="0"/>
+                <a:cs typeface="Calibri" panose="020F0502020204030204" pitchFamily="34" charset="0"/>
               </a:rPr>
               <a:t>overloading</a:t>
             </a:r>
             <a:r>
-              <a:rPr lang="bg-BG" sz="3000">
+              <a:rPr lang="bg-BG" sz="3000" dirty="0">
                 <a:solidFill>
                   <a:schemeClr val="bg1">
                     <a:lumMod val="60000"/>
                     <a:lumOff val="40000"/>
                   </a:schemeClr>
                 </a:solidFill>
+                <a:latin typeface="Calibri" panose="020F0502020204030204" pitchFamily="34" charset="0"/>
+                <a:cs typeface="Calibri" panose="020F0502020204030204" pitchFamily="34" charset="0"/>
               </a:rPr>
               <a:t> (презареждане) </a:t>
             </a:r>
             <a:r>
-              <a:rPr lang="en-US" sz="3000">
+              <a:rPr lang="en-US" sz="3000" dirty="0">
                 <a:solidFill>
                   <a:schemeClr val="bg2"/>
                 </a:solidFill>
+                <a:latin typeface="Calibri" panose="020F0502020204030204" pitchFamily="34" charset="0"/>
+                <a:cs typeface="Calibri" panose="020F0502020204030204" pitchFamily="34" charset="0"/>
               </a:rPr>
               <a:t>– </a:t>
             </a:r>
             <a:r>
-              <a:rPr lang="bg-BG" sz="3000">
+              <a:rPr lang="bg-BG" sz="3000" dirty="0">
                 <a:solidFill>
                   <a:schemeClr val="bg2"/>
                 </a:solidFill>
+                <a:latin typeface="Calibri" panose="020F0502020204030204" pitchFamily="34" charset="0"/>
+                <a:cs typeface="Calibri" panose="020F0502020204030204" pitchFamily="34" charset="0"/>
               </a:rPr>
               <a:t>едно и също име на метода, но различна имплементация</a:t>
             </a:r>
-            <a:endParaRPr lang="en-US" sz="3000">
+            <a:endParaRPr lang="en-US" sz="3000" dirty="0">
               <a:solidFill>
                 <a:schemeClr val="bg2"/>
               </a:solidFill>
+              <a:latin typeface="Calibri" panose="020F0502020204030204" pitchFamily="34" charset="0"/>
+              <a:cs typeface="Calibri" panose="020F0502020204030204" pitchFamily="34" charset="0"/>
             </a:endParaRPr>
           </a:p>
           <a:p>
@@ -30652,20 +30684,24 @@
               </a:buClr>
             </a:pPr>
             <a:r>
-              <a:rPr lang="bg-BG" sz="3200">
+              <a:rPr lang="bg-BG" sz="3200" dirty="0">
                 <a:solidFill>
                   <a:schemeClr val="bg1">
                     <a:lumMod val="60000"/>
                     <a:lumOff val="40000"/>
                   </a:schemeClr>
                 </a:solidFill>
+                <a:latin typeface="Calibri" panose="020F0502020204030204" pitchFamily="34" charset="0"/>
+                <a:cs typeface="Calibri" panose="020F0502020204030204" pitchFamily="34" charset="0"/>
               </a:rPr>
               <a:t>По време на изпълнение</a:t>
             </a:r>
-            <a:endParaRPr lang="en-US" sz="3200">
+            <a:endParaRPr lang="en-US" sz="3200" dirty="0">
               <a:solidFill>
                 <a:schemeClr val="bg2"/>
               </a:solidFill>
+              <a:latin typeface="Calibri" panose="020F0502020204030204" pitchFamily="34" charset="0"/>
+              <a:cs typeface="Calibri" panose="020F0502020204030204" pitchFamily="34" charset="0"/>
             </a:endParaRPr>
           </a:p>
           <a:p>
@@ -30684,101 +30720,123 @@
               </a:buClr>
             </a:pPr>
             <a:r>
-              <a:rPr lang="bg-BG" sz="3000">
+              <a:rPr lang="bg-BG" sz="3000" dirty="0">
                 <a:solidFill>
                   <a:schemeClr val="bg2"/>
                 </a:solidFill>
+                <a:latin typeface="Calibri" panose="020F0502020204030204" pitchFamily="34" charset="0"/>
+                <a:cs typeface="Calibri" panose="020F0502020204030204" pitchFamily="34" charset="0"/>
               </a:rPr>
               <a:t>Осъществява се чрез </a:t>
             </a:r>
             <a:r>
-              <a:rPr lang="en-US" sz="3000">
+              <a:rPr lang="en-US" sz="3000" dirty="0">
                 <a:solidFill>
                   <a:schemeClr val="bg1">
                     <a:lumMod val="60000"/>
                     <a:lumOff val="40000"/>
                   </a:schemeClr>
                 </a:solidFill>
+                <a:latin typeface="Calibri" panose="020F0502020204030204" pitchFamily="34" charset="0"/>
+                <a:cs typeface="Calibri" panose="020F0502020204030204" pitchFamily="34" charset="0"/>
               </a:rPr>
               <a:t>overriding</a:t>
             </a:r>
             <a:r>
-              <a:rPr lang="bg-BG" sz="3000">
+              <a:rPr lang="bg-BG" sz="3000" dirty="0">
                 <a:solidFill>
                   <a:schemeClr val="bg1">
                     <a:lumMod val="60000"/>
                     <a:lumOff val="40000"/>
                   </a:schemeClr>
                 </a:solidFill>
+                <a:latin typeface="Calibri" panose="020F0502020204030204" pitchFamily="34" charset="0"/>
+                <a:cs typeface="Calibri" panose="020F0502020204030204" pitchFamily="34" charset="0"/>
               </a:rPr>
               <a:t> (презаписване)</a:t>
             </a:r>
             <a:r>
-              <a:rPr lang="bg-BG" sz="3000">
+              <a:rPr lang="bg-BG" sz="3000" dirty="0">
                 <a:solidFill>
                   <a:schemeClr val="bg2"/>
                 </a:solidFill>
+                <a:latin typeface="Calibri" panose="020F0502020204030204" pitchFamily="34" charset="0"/>
+                <a:cs typeface="Calibri" panose="020F0502020204030204" pitchFamily="34" charset="0"/>
               </a:rPr>
               <a:t> </a:t>
             </a:r>
             <a:r>
-              <a:rPr lang="en-US" sz="3000">
+              <a:rPr lang="en-US" sz="3000" dirty="0">
                 <a:solidFill>
                   <a:schemeClr val="bg2"/>
                 </a:solidFill>
+                <a:latin typeface="Calibri" panose="020F0502020204030204" pitchFamily="34" charset="0"/>
+                <a:cs typeface="Calibri" panose="020F0502020204030204" pitchFamily="34" charset="0"/>
               </a:rPr>
               <a:t>– </a:t>
             </a:r>
             <a:r>
-              <a:rPr lang="bg-BG" sz="3000">
+              <a:rPr lang="bg-BG" sz="3000" dirty="0">
                 <a:solidFill>
                   <a:schemeClr val="bg2"/>
                 </a:solidFill>
+                <a:latin typeface="Calibri" panose="020F0502020204030204" pitchFamily="34" charset="0"/>
+                <a:cs typeface="Calibri" panose="020F0502020204030204" pitchFamily="34" charset="0"/>
               </a:rPr>
               <a:t>чрез ключовите думи</a:t>
             </a:r>
             <a:r>
-              <a:rPr lang="en-US" sz="3000">
+              <a:rPr lang="en-US" sz="3000" dirty="0">
                 <a:solidFill>
                   <a:schemeClr val="bg2"/>
                 </a:solidFill>
+                <a:latin typeface="Calibri" panose="020F0502020204030204" pitchFamily="34" charset="0"/>
+                <a:cs typeface="Calibri" panose="020F0502020204030204" pitchFamily="34" charset="0"/>
               </a:rPr>
               <a:t> </a:t>
             </a:r>
             <a:r>
-              <a:rPr lang="en-US" sz="3000">
+              <a:rPr lang="en-US" sz="3000" dirty="0">
                 <a:solidFill>
                   <a:schemeClr val="bg1">
                     <a:lumMod val="60000"/>
                     <a:lumOff val="40000"/>
                   </a:schemeClr>
                 </a:solidFill>
+                <a:latin typeface="Calibri" panose="020F0502020204030204" pitchFamily="34" charset="0"/>
+                <a:cs typeface="Calibri" panose="020F0502020204030204" pitchFamily="34" charset="0"/>
               </a:rPr>
               <a:t>virtual</a:t>
             </a:r>
             <a:r>
-              <a:rPr lang="en-US" sz="3000">
+              <a:rPr lang="en-US" sz="3000" dirty="0">
                 <a:solidFill>
                   <a:schemeClr val="bg2"/>
                 </a:solidFill>
+                <a:latin typeface="Calibri" panose="020F0502020204030204" pitchFamily="34" charset="0"/>
+                <a:cs typeface="Calibri" panose="020F0502020204030204" pitchFamily="34" charset="0"/>
               </a:rPr>
               <a:t> + </a:t>
             </a:r>
             <a:r>
-              <a:rPr lang="en-US" sz="3000">
+              <a:rPr lang="en-US" sz="3000" dirty="0">
                 <a:solidFill>
                   <a:schemeClr val="bg1">
                     <a:lumMod val="60000"/>
                     <a:lumOff val="40000"/>
                   </a:schemeClr>
                 </a:solidFill>
+                <a:latin typeface="Calibri" panose="020F0502020204030204" pitchFamily="34" charset="0"/>
+                <a:cs typeface="Calibri" panose="020F0502020204030204" pitchFamily="34" charset="0"/>
               </a:rPr>
               <a:t>override</a:t>
             </a:r>
-            <a:endParaRPr lang="en-US" sz="3000">
+            <a:endParaRPr lang="en-US" sz="3000" dirty="0">
               <a:solidFill>
                 <a:schemeClr val="bg2"/>
               </a:solidFill>
+              <a:latin typeface="Calibri" panose="020F0502020204030204" pitchFamily="34" charset="0"/>
+              <a:cs typeface="Calibri" panose="020F0502020204030204" pitchFamily="34" charset="0"/>
             </a:endParaRPr>
           </a:p>
         </p:txBody>

</xml_diff>

<commit_message>
many fixes and improvements
</commit_message>
<xml_diff>
--- a/Courses/Software-Sciences/Module-1-OOP/11.1-Polymorphism-Basics/11.1-Polymorphism-Basics.pptx
+++ b/Courses/Software-Sciences/Module-1-OOP/11.1-Polymorphism-Basics/11.1-Polymorphism-Basics.pptx
@@ -327,7 +327,7 @@
           <a:p>
             <a:fld id="{4E087215-0C8F-4762-A664-737A353EC9A4}" type="datetimeFigureOut">
               <a:rPr lang="bg-BG" smtClean="0"/>
-              <a:t>17.05.23 г.</a:t>
+              <a:t>2.7.2023 г.</a:t>
             </a:fld>
             <a:endParaRPr lang="bg-BG"/>
           </a:p>
@@ -518,7 +518,7 @@
           <a:p>
             <a:fld id="{72D84649-876A-46C9-8472-14CB09C070D8}" type="datetimeFigureOut">
               <a:rPr lang="en-US" smtClean="0"/>
-              <a:t>5/17/23</a:t>
+              <a:t>2-Jul-23</a:t>
             </a:fld>
             <a:endParaRPr lang="en-US"/>
           </a:p>
@@ -12674,7 +12674,7 @@
         </p:nvSpPr>
         <p:spPr bwMode="auto">
           <a:xfrm>
-            <a:off x="247147" y="1821848"/>
+            <a:off x="247147" y="1917329"/>
             <a:ext cx="5773547" cy="3131671"/>
           </a:xfrm>
           <a:prstGeom prst="rect">
@@ -12858,7 +12858,7 @@
         </p:nvSpPr>
         <p:spPr bwMode="auto">
           <a:xfrm>
-            <a:off x="6006000" y="1821847"/>
+            <a:off x="6006000" y="1917328"/>
             <a:ext cx="6036662" cy="3131671"/>
           </a:xfrm>
           <a:prstGeom prst="rect">
@@ -17645,7 +17645,7 @@
         </p:nvSpPr>
         <p:spPr>
           <a:xfrm>
-            <a:off x="699450" y="1771441"/>
+            <a:off x="699450" y="1917344"/>
             <a:ext cx="10800000" cy="2141656"/>
           </a:xfrm>
           <a:prstGeom prst="rect">
@@ -18369,8 +18369,8 @@
         </p:nvSpPr>
         <p:spPr>
           <a:xfrm>
-            <a:off x="186952" y="1539000"/>
-            <a:ext cx="11818096" cy="5528766"/>
+            <a:off x="186952" y="1449000"/>
+            <a:ext cx="11818096" cy="5040000"/>
           </a:xfrm>
         </p:spPr>
         <p:txBody>
@@ -18384,10 +18384,13 @@
               <a:buAutoNum type="arabicPeriod"/>
             </a:pPr>
             <a:r>
+              <a:rPr lang="bg-BG" b="1" dirty="0"/>
+              <a:t>Полиморфизъм</a:t>
+            </a:r>
+            <a:r>
               <a:rPr lang="bg-BG" dirty="0"/>
-              <a:t>Полиморфизъм</a:t>
-            </a:r>
-            <a:endParaRPr lang="en-US" dirty="0"/>
+              <a:t> в ООП: третиране на обекти от производен клас като обекти от базов клас</a:t>
+            </a:r>
           </a:p>
           <a:p>
             <a:pPr marL="514350" indent="-514350">
@@ -18399,8 +18402,12 @@
               <a:t>Операторите </a:t>
             </a:r>
             <a:r>
+              <a:rPr lang="en-US" b="1" dirty="0"/>
+              <a:t>is</a:t>
+            </a:r>
+            <a:r>
               <a:rPr lang="en-US" dirty="0"/>
-              <a:t>Is </a:t>
+              <a:t> </a:t>
             </a:r>
             <a:r>
               <a:rPr lang="bg-BG" dirty="0"/>
@@ -18408,9 +18415,20 @@
             </a:r>
             <a:r>
               <a:rPr lang="en-US" dirty="0"/>
-              <a:t> As</a:t>
-            </a:r>
-            <a:endParaRPr lang="bg-BG" dirty="0"/>
+              <a:t> </a:t>
+            </a:r>
+            <a:r>
+              <a:rPr lang="en-US" b="1" dirty="0"/>
+              <a:t>as</a:t>
+            </a:r>
+            <a:r>
+              <a:rPr lang="en-US" dirty="0"/>
+              <a:t> (</a:t>
+            </a:r>
+            <a:r>
+              <a:rPr lang="bg-BG" dirty="0"/>
+              <a:t>проверка и смяна на тип)</a:t>
+            </a:r>
           </a:p>
           <a:p>
             <a:pPr marL="514350" indent="-514350">
@@ -18424,10 +18442,7 @@
             <a:endParaRPr lang="en-GB" dirty="0"/>
           </a:p>
           <a:p>
-            <a:pPr marL="514350" indent="-514350">
-              <a:buFont typeface="+mj-lt"/>
-              <a:buAutoNum type="arabicPeriod"/>
-            </a:pPr>
+            <a:pPr lvl="1"/>
             <a:r>
               <a:rPr lang="bg-BG" dirty="0"/>
               <a:t>Полиморфизъм по време на компилация </a:t>
@@ -18441,22 +18456,28 @@
               <a:t>варианти на методи (</a:t>
             </a:r>
             <a:r>
+              <a:rPr lang="en-US" b="1" dirty="0"/>
+              <a:t>overload</a:t>
+            </a:r>
+            <a:r>
               <a:rPr lang="en-US" dirty="0"/>
-              <a:t>overload)</a:t>
-            </a:r>
-          </a:p>
-          <a:p>
-            <a:pPr marL="514350" indent="-514350">
-              <a:buFont typeface="+mj-lt"/>
-              <a:buAutoNum type="arabicPeriod"/>
-            </a:pPr>
+              <a:t>)</a:t>
+            </a:r>
+            <a:r>
+              <a:rPr lang="bg-BG" dirty="0"/>
+              <a:t> с различни параметри</a:t>
+            </a:r>
+            <a:endParaRPr lang="en-US" dirty="0"/>
+          </a:p>
+          <a:p>
+            <a:pPr lvl="1"/>
             <a:r>
               <a:rPr lang="bg-BG" dirty="0"/>
               <a:t>Полиморфизъм по време на изпълнение</a:t>
             </a:r>
             <a:r>
               <a:rPr lang="en-US" dirty="0"/>
-              <a:t>– </a:t>
+              <a:t> – </a:t>
             </a:r>
             <a:r>
               <a:rPr lang="bg-BG" dirty="0"/>
@@ -18464,7 +18485,19 @@
             </a:r>
             <a:r>
               <a:rPr lang="en-US" dirty="0"/>
-              <a:t> (override)</a:t>
+              <a:t> (</a:t>
+            </a:r>
+            <a:r>
+              <a:rPr lang="en-US" b="1" dirty="0"/>
+              <a:t>override</a:t>
+            </a:r>
+            <a:r>
+              <a:rPr lang="en-US" dirty="0"/>
+              <a:t>) </a:t>
+            </a:r>
+            <a:r>
+              <a:rPr lang="bg-BG" dirty="0"/>
+              <a:t>в клас-наследник</a:t>
             </a:r>
             <a:endParaRPr lang="en-GB" dirty="0"/>
           </a:p>
@@ -26288,6 +26321,34 @@
       </p:pic>
       <p:sp>
         <p:nvSpPr>
+          <p:cNvPr id="3" name="Subtitle 2">
+            <a:extLst>
+              <a:ext uri="{FF2B5EF4-FFF2-40B4-BE49-F238E27FC236}">
+                <a16:creationId xmlns:a16="http://schemas.microsoft.com/office/drawing/2014/main" id="{51A936EE-5CBB-3EDA-C0AD-36911500B48E}"/>
+              </a:ext>
+            </a:extLst>
+          </p:cNvPr>
+          <p:cNvSpPr>
+            <a:spLocks noGrp="1"/>
+          </p:cNvSpPr>
+          <p:nvPr>
+            <p:ph type="subTitle" sz="quarter" idx="11"/>
+          </p:nvPr>
+        </p:nvSpPr>
+        <p:spPr/>
+        <p:txBody>
+          <a:bodyPr/>
+          <a:lstStyle/>
+          <a:p>
+            <a:r>
+              <a:rPr lang="bg-BG"/>
+              <a:t>Достъп до обект през базов тип</a:t>
+            </a:r>
+          </a:p>
+        </p:txBody>
+      </p:sp>
+      <p:sp>
+        <p:nvSpPr>
           <p:cNvPr id="4" name="Title 3">
             <a:extLst>
               <a:ext uri="{FF2B5EF4-FFF2-40B4-BE49-F238E27FC236}">
@@ -26304,7 +26365,7 @@
         </p:nvSpPr>
         <p:spPr>
           <a:xfrm>
-            <a:off x="613522" y="4914000"/>
+            <a:off x="615109" y="4704825"/>
             <a:ext cx="10961783" cy="768084"/>
           </a:xfrm>
         </p:spPr>
@@ -26314,7 +26375,7 @@
           <a:p>
             <a:r>
               <a:rPr lang="bg-BG" dirty="0"/>
-              <a:t>Полиморфизъм</a:t>
+              <a:t>Полиморфизъм в ООП</a:t>
             </a:r>
             <a:endParaRPr lang="en-US" dirty="0"/>
           </a:p>

</xml_diff>